<commit_message>
Updated slide 22 example
</commit_message>
<xml_diff>
--- a/Section-05/Lecture5.pptx
+++ b/Section-05/Lecture5.pptx
@@ -18188,7 +18188,7 @@
           <p:nvPr>
             <p:extLst>
               <p:ext uri="{D42A27DB-BD31-4B8C-83A1-F6EECF244321}">
-                <p14:modId xmlns:p14="http://schemas.microsoft.com/office/powerpoint/2010/main" val="3083199164"/>
+                <p14:modId xmlns:p14="http://schemas.microsoft.com/office/powerpoint/2010/main" val="2166725097"/>
               </p:ext>
             </p:extLst>
           </p:nvPr>
@@ -18240,7 +18240,7 @@
                         <a:rPr lang="en-US" sz="2400" b="1" dirty="0">
                           <a:latin typeface="Century Gothic" panose="020B0502020202020204" pitchFamily="34" charset="0"/>
                         </a:rPr>
-                        <a:t> &amp; | </a:t>
+                        <a:t> | </a:t>
                       </a:r>
                       <a:r>
                         <a:rPr lang="en-US" sz="2400" b="1" dirty="0" err="1">
@@ -18288,7 +18288,58 @@
         </p:nvSpPr>
         <p:spPr>
           <a:xfrm rot="10800000">
-            <a:off x="6200871" y="5115971"/>
+            <a:off x="2191735" y="5187940"/>
+            <a:ext cx="355904" cy="645860"/>
+          </a:xfrm>
+          <a:prstGeom prst="downArrow">
+            <a:avLst/>
+          </a:prstGeom>
+          <a:solidFill>
+            <a:schemeClr val="accent1">
+              <a:lumMod val="75000"/>
+            </a:schemeClr>
+          </a:solidFill>
+        </p:spPr>
+        <p:style>
+          <a:lnRef idx="2">
+            <a:schemeClr val="accent1">
+              <a:shade val="50000"/>
+            </a:schemeClr>
+          </a:lnRef>
+          <a:fillRef idx="1">
+            <a:schemeClr val="accent1"/>
+          </a:fillRef>
+          <a:effectRef idx="0">
+            <a:schemeClr val="accent1"/>
+          </a:effectRef>
+          <a:fontRef idx="minor">
+            <a:schemeClr val="lt1"/>
+          </a:fontRef>
+        </p:style>
+        <p:txBody>
+          <a:bodyPr rtlCol="0" anchor="ctr"/>
+          <a:lstStyle/>
+          <a:p>
+            <a:pPr algn="ctr"/>
+            <a:endParaRPr lang="en-US"/>
+          </a:p>
+        </p:txBody>
+      </p:sp>
+      <p:sp>
+        <p:nvSpPr>
+          <p:cNvPr id="6" name="Arrow: Down 5">
+            <a:extLst>
+              <a:ext uri="{FF2B5EF4-FFF2-40B4-BE49-F238E27FC236}">
+                <a16:creationId xmlns:a16="http://schemas.microsoft.com/office/drawing/2014/main" id="{CFD976E6-435F-48F5-901A-3387A684B4A6}"/>
+              </a:ext>
+            </a:extLst>
+          </p:cNvPr>
+          <p:cNvSpPr/>
+          <p:nvPr/>
+        </p:nvSpPr>
+        <p:spPr>
+          <a:xfrm rot="10800000">
+            <a:off x="8137986" y="5185642"/>
             <a:ext cx="355904" cy="645860"/>
           </a:xfrm>
           <a:prstGeom prst="downArrow">
@@ -18325,10 +18376,10 @@
       </p:sp>
       <p:sp>
         <p:nvSpPr>
-          <p:cNvPr id="6" name="Arrow: Down 5">
+          <p:cNvPr id="7" name="Arrow: Down 6">
             <a:extLst>
               <a:ext uri="{FF2B5EF4-FFF2-40B4-BE49-F238E27FC236}">
-                <a16:creationId xmlns:a16="http://schemas.microsoft.com/office/drawing/2014/main" id="{CFD976E6-435F-48F5-901A-3387A684B4A6}"/>
+                <a16:creationId xmlns:a16="http://schemas.microsoft.com/office/drawing/2014/main" id="{524DEFD0-AEB2-4AB9-920D-5582CCBC493A}"/>
               </a:ext>
             </a:extLst>
           </p:cNvPr>
@@ -18337,14 +18388,16 @@
         </p:nvSpPr>
         <p:spPr>
           <a:xfrm rot="10800000">
-            <a:off x="8412306" y="5130778"/>
+            <a:off x="6884598" y="5216520"/>
             <a:ext cx="355904" cy="645860"/>
           </a:xfrm>
           <a:prstGeom prst="downArrow">
             <a:avLst/>
           </a:prstGeom>
           <a:solidFill>
-            <a:srgbClr val="FF0000"/>
+            <a:schemeClr val="accent1">
+              <a:lumMod val="75000"/>
+            </a:schemeClr>
           </a:solidFill>
         </p:spPr>
         <p:style>

</xml_diff>